<commit_message>
Updated examples & app validation results for manuscript
</commit_message>
<xml_diff>
--- a/ROC_power_app/SimulationDescription.pptx
+++ b/ROC_power_app/SimulationDescription.pptx
@@ -243,7 +243,7 @@
           <a:p>
             <a:fld id="{CF0750D3-DDE0-42CE-98AF-A59F3AFCB4B1}" type="datetimeFigureOut">
               <a:rPr lang="en-CA" smtClean="0"/>
-              <a:t>2022-01-06</a:t>
+              <a:t>2022-01-07</a:t>
             </a:fld>
             <a:endParaRPr lang="en-CA"/>
           </a:p>
@@ -413,7 +413,7 @@
           <a:p>
             <a:fld id="{CF0750D3-DDE0-42CE-98AF-A59F3AFCB4B1}" type="datetimeFigureOut">
               <a:rPr lang="en-CA" smtClean="0"/>
-              <a:t>2022-01-06</a:t>
+              <a:t>2022-01-07</a:t>
             </a:fld>
             <a:endParaRPr lang="en-CA"/>
           </a:p>
@@ -593,7 +593,7 @@
           <a:p>
             <a:fld id="{CF0750D3-DDE0-42CE-98AF-A59F3AFCB4B1}" type="datetimeFigureOut">
               <a:rPr lang="en-CA" smtClean="0"/>
-              <a:t>2022-01-06</a:t>
+              <a:t>2022-01-07</a:t>
             </a:fld>
             <a:endParaRPr lang="en-CA"/>
           </a:p>
@@ -763,7 +763,7 @@
           <a:p>
             <a:fld id="{CF0750D3-DDE0-42CE-98AF-A59F3AFCB4B1}" type="datetimeFigureOut">
               <a:rPr lang="en-CA" smtClean="0"/>
-              <a:t>2022-01-06</a:t>
+              <a:t>2022-01-07</a:t>
             </a:fld>
             <a:endParaRPr lang="en-CA"/>
           </a:p>
@@ -1007,7 +1007,7 @@
           <a:p>
             <a:fld id="{CF0750D3-DDE0-42CE-98AF-A59F3AFCB4B1}" type="datetimeFigureOut">
               <a:rPr lang="en-CA" smtClean="0"/>
-              <a:t>2022-01-06</a:t>
+              <a:t>2022-01-07</a:t>
             </a:fld>
             <a:endParaRPr lang="en-CA"/>
           </a:p>
@@ -1239,7 +1239,7 @@
           <a:p>
             <a:fld id="{CF0750D3-DDE0-42CE-98AF-A59F3AFCB4B1}" type="datetimeFigureOut">
               <a:rPr lang="en-CA" smtClean="0"/>
-              <a:t>2022-01-06</a:t>
+              <a:t>2022-01-07</a:t>
             </a:fld>
             <a:endParaRPr lang="en-CA"/>
           </a:p>
@@ -1606,7 +1606,7 @@
           <a:p>
             <a:fld id="{CF0750D3-DDE0-42CE-98AF-A59F3AFCB4B1}" type="datetimeFigureOut">
               <a:rPr lang="en-CA" smtClean="0"/>
-              <a:t>2022-01-06</a:t>
+              <a:t>2022-01-07</a:t>
             </a:fld>
             <a:endParaRPr lang="en-CA"/>
           </a:p>
@@ -1724,7 +1724,7 @@
           <a:p>
             <a:fld id="{CF0750D3-DDE0-42CE-98AF-A59F3AFCB4B1}" type="datetimeFigureOut">
               <a:rPr lang="en-CA" smtClean="0"/>
-              <a:t>2022-01-06</a:t>
+              <a:t>2022-01-07</a:t>
             </a:fld>
             <a:endParaRPr lang="en-CA"/>
           </a:p>
@@ -1819,7 +1819,7 @@
           <a:p>
             <a:fld id="{CF0750D3-DDE0-42CE-98AF-A59F3AFCB4B1}" type="datetimeFigureOut">
               <a:rPr lang="en-CA" smtClean="0"/>
-              <a:t>2022-01-06</a:t>
+              <a:t>2022-01-07</a:t>
             </a:fld>
             <a:endParaRPr lang="en-CA"/>
           </a:p>
@@ -2096,7 +2096,7 @@
           <a:p>
             <a:fld id="{CF0750D3-DDE0-42CE-98AF-A59F3AFCB4B1}" type="datetimeFigureOut">
               <a:rPr lang="en-CA" smtClean="0"/>
-              <a:t>2022-01-06</a:t>
+              <a:t>2022-01-07</a:t>
             </a:fld>
             <a:endParaRPr lang="en-CA"/>
           </a:p>
@@ -2353,7 +2353,7 @@
           <a:p>
             <a:fld id="{CF0750D3-DDE0-42CE-98AF-A59F3AFCB4B1}" type="datetimeFigureOut">
               <a:rPr lang="en-CA" smtClean="0"/>
-              <a:t>2022-01-06</a:t>
+              <a:t>2022-01-07</a:t>
             </a:fld>
             <a:endParaRPr lang="en-CA"/>
           </a:p>
@@ -2566,7 +2566,7 @@
           <a:p>
             <a:fld id="{CF0750D3-DDE0-42CE-98AF-A59F3AFCB4B1}" type="datetimeFigureOut">
               <a:rPr lang="en-CA" smtClean="0"/>
-              <a:t>2022-01-06</a:t>
+              <a:t>2022-01-07</a:t>
             </a:fld>
             <a:endParaRPr lang="en-CA"/>
           </a:p>
@@ -3375,8 +3375,13 @@
             </a:r>
             <a:r>
               <a:rPr lang="en-CA" sz="1387" dirty="0"/>
-              <a:t> (and bootstrapped DPP, if applicable)</a:t>
-            </a:r>
+              <a:t> (and/or </a:t>
+            </a:r>
+            <a:r>
+              <a:rPr lang="en-CA" sz="1387"/>
+              <a:t>bootstrapped DPP)</a:t>
+            </a:r>
+            <a:endParaRPr lang="en-CA" sz="1387" dirty="0"/>
           </a:p>
           <a:p>
             <a:pPr marL="330016" indent="-330016">

</xml_diff>